<commit_message>
modificati alcuni riferimenti delle request (resi coerenti con il relativo controller)
</commit_message>
<xml_diff>
--- a/Direttive progetto e class diagram/siw-progetto-giugno-2020.pptx
+++ b/Direttive progetto e class diagram/siw-progetto-giugno-2020.pptx
@@ -218,7 +218,7 @@
           <a:p>
             <a:fld id="{6AF75452-8E9B-2A4A-993A-81C6082A6AE5}" type="datetimeFigureOut">
               <a:rPr lang="it-IT" smtClean="0"/>
-              <a:t>31/05/2020</a:t>
+              <a:t>16/06/2020</a:t>
             </a:fld>
             <a:endParaRPr lang="en-US"/>
           </a:p>
@@ -518,14 +518,14 @@
           <a:ln/>
           <a:extLst>
             <a:ext uri="{909E8E84-426E-40dd-AFC4-6F175D3DCCD1}">
-              <a14:hiddenFill xmlns:a14="http://schemas.microsoft.com/office/drawing/2010/main" xmlns="">
+              <a14:hiddenFill xmlns="" xmlns:a14="http://schemas.microsoft.com/office/drawing/2010/main">
                 <a:solidFill>
                   <a:srgbClr val="FFFFFF"/>
                 </a:solidFill>
               </a14:hiddenFill>
             </a:ext>
             <a:ext uri="{91240B29-F687-4f45-9708-019B960494DF}">
-              <a14:hiddenLine xmlns:a14="http://schemas.microsoft.com/office/drawing/2010/main" xmlns="" w="9525">
+              <a14:hiddenLine xmlns="" xmlns:a14="http://schemas.microsoft.com/office/drawing/2010/main" w="9525">
                 <a:solidFill>
                   <a:srgbClr val="000000"/>
                 </a:solidFill>
@@ -685,14 +685,14 @@
           <a:ln/>
           <a:extLst>
             <a:ext uri="{909E8E84-426E-40dd-AFC4-6F175D3DCCD1}">
-              <a14:hiddenFill xmlns:a14="http://schemas.microsoft.com/office/drawing/2010/main" xmlns="">
+              <a14:hiddenFill xmlns="" xmlns:a14="http://schemas.microsoft.com/office/drawing/2010/main">
                 <a:solidFill>
                   <a:srgbClr val="FFFFFF"/>
                 </a:solidFill>
               </a14:hiddenFill>
             </a:ext>
             <a:ext uri="{91240B29-F687-4f45-9708-019B960494DF}">
-              <a14:hiddenLine xmlns:a14="http://schemas.microsoft.com/office/drawing/2010/main" xmlns="" w="9525">
+              <a14:hiddenLine xmlns="" xmlns:a14="http://schemas.microsoft.com/office/drawing/2010/main" w="9525">
                 <a:solidFill>
                   <a:srgbClr val="000000"/>
                 </a:solidFill>
@@ -702,7 +702,7 @@
               </a14:hiddenLine>
             </a:ext>
             <a:ext uri="{FAA26D3D-D897-4be2-8F04-BA451C77F1D7}">
-              <ma14:placeholderFlag xmlns:ma14="http://schemas.microsoft.com/office/mac/drawingml/2011/main" xmlns="" val="1"/>
+              <ma14:placeholderFlag xmlns="" xmlns:ma14="http://schemas.microsoft.com/office/mac/drawingml/2011/main" val="1"/>
             </a:ext>
           </a:extLst>
         </p:spPr>
@@ -755,14 +755,14 @@
           <a:ln/>
           <a:extLst>
             <a:ext uri="{909E8E84-426E-40dd-AFC4-6F175D3DCCD1}">
-              <a14:hiddenFill xmlns:a14="http://schemas.microsoft.com/office/drawing/2010/main" xmlns="">
+              <a14:hiddenFill xmlns="" xmlns:a14="http://schemas.microsoft.com/office/drawing/2010/main">
                 <a:solidFill>
                   <a:srgbClr val="FFFFFF"/>
                 </a:solidFill>
               </a14:hiddenFill>
             </a:ext>
             <a:ext uri="{91240B29-F687-4f45-9708-019B960494DF}">
-              <a14:hiddenLine xmlns:a14="http://schemas.microsoft.com/office/drawing/2010/main" xmlns="" w="9525">
+              <a14:hiddenLine xmlns="" xmlns:a14="http://schemas.microsoft.com/office/drawing/2010/main" w="9525">
                 <a:solidFill>
                   <a:srgbClr val="000000"/>
                 </a:solidFill>
@@ -923,14 +923,14 @@
           <a:ln/>
           <a:extLst>
             <a:ext uri="{909E8E84-426E-40dd-AFC4-6F175D3DCCD1}">
-              <a14:hiddenFill xmlns:a14="http://schemas.microsoft.com/office/drawing/2010/main" xmlns="">
+              <a14:hiddenFill xmlns="" xmlns:a14="http://schemas.microsoft.com/office/drawing/2010/main">
                 <a:solidFill>
                   <a:srgbClr val="FFFFFF"/>
                 </a:solidFill>
               </a14:hiddenFill>
             </a:ext>
             <a:ext uri="{91240B29-F687-4f45-9708-019B960494DF}">
-              <a14:hiddenLine xmlns:a14="http://schemas.microsoft.com/office/drawing/2010/main" xmlns="" w="9525">
+              <a14:hiddenLine xmlns="" xmlns:a14="http://schemas.microsoft.com/office/drawing/2010/main" w="9525">
                 <a:solidFill>
                   <a:srgbClr val="000000"/>
                 </a:solidFill>
@@ -940,7 +940,7 @@
               </a14:hiddenLine>
             </a:ext>
             <a:ext uri="{FAA26D3D-D897-4be2-8F04-BA451C77F1D7}">
-              <ma14:placeholderFlag xmlns:ma14="http://schemas.microsoft.com/office/mac/drawingml/2011/main" xmlns="" val="1"/>
+              <ma14:placeholderFlag xmlns="" xmlns:ma14="http://schemas.microsoft.com/office/mac/drawingml/2011/main" val="1"/>
             </a:ext>
           </a:extLst>
         </p:spPr>
@@ -993,14 +993,14 @@
           <a:ln/>
           <a:extLst>
             <a:ext uri="{909E8E84-426E-40dd-AFC4-6F175D3DCCD1}">
-              <a14:hiddenFill xmlns:a14="http://schemas.microsoft.com/office/drawing/2010/main" xmlns="">
+              <a14:hiddenFill xmlns="" xmlns:a14="http://schemas.microsoft.com/office/drawing/2010/main">
                 <a:solidFill>
                   <a:srgbClr val="FFFFFF"/>
                 </a:solidFill>
               </a14:hiddenFill>
             </a:ext>
             <a:ext uri="{91240B29-F687-4f45-9708-019B960494DF}">
-              <a14:hiddenLine xmlns:a14="http://schemas.microsoft.com/office/drawing/2010/main" xmlns="" w="9525">
+              <a14:hiddenLine xmlns="" xmlns:a14="http://schemas.microsoft.com/office/drawing/2010/main" w="9525">
                 <a:solidFill>
                   <a:srgbClr val="000000"/>
                 </a:solidFill>
@@ -1161,14 +1161,14 @@
           <a:ln/>
           <a:extLst>
             <a:ext uri="{909E8E84-426E-40dd-AFC4-6F175D3DCCD1}">
-              <a14:hiddenFill xmlns:a14="http://schemas.microsoft.com/office/drawing/2010/main" xmlns="">
+              <a14:hiddenFill xmlns="" xmlns:a14="http://schemas.microsoft.com/office/drawing/2010/main">
                 <a:solidFill>
                   <a:srgbClr val="FFFFFF"/>
                 </a:solidFill>
               </a14:hiddenFill>
             </a:ext>
             <a:ext uri="{91240B29-F687-4f45-9708-019B960494DF}">
-              <a14:hiddenLine xmlns:a14="http://schemas.microsoft.com/office/drawing/2010/main" xmlns="" w="9525">
+              <a14:hiddenLine xmlns="" xmlns:a14="http://schemas.microsoft.com/office/drawing/2010/main" w="9525">
                 <a:solidFill>
                   <a:srgbClr val="000000"/>
                 </a:solidFill>
@@ -1178,7 +1178,7 @@
               </a14:hiddenLine>
             </a:ext>
             <a:ext uri="{FAA26D3D-D897-4be2-8F04-BA451C77F1D7}">
-              <ma14:placeholderFlag xmlns:ma14="http://schemas.microsoft.com/office/mac/drawingml/2011/main" xmlns="" val="1"/>
+              <ma14:placeholderFlag xmlns="" xmlns:ma14="http://schemas.microsoft.com/office/mac/drawingml/2011/main" val="1"/>
             </a:ext>
           </a:extLst>
         </p:spPr>
@@ -1774,7 +1774,7 @@
           <a:p>
             <a:fld id="{7A805A2E-4434-7E48-B506-6CB9726E48D0}" type="datetimeFigureOut">
               <a:rPr lang="it-IT" smtClean="0"/>
-              <a:t>31/05/2020</a:t>
+              <a:t>16/06/2020</a:t>
             </a:fld>
             <a:endParaRPr lang="en-US"/>
           </a:p>
@@ -1956,7 +1956,7 @@
           <a:p>
             <a:fld id="{7A805A2E-4434-7E48-B506-6CB9726E48D0}" type="datetimeFigureOut">
               <a:rPr lang="it-IT" smtClean="0"/>
-              <a:t>31/05/2020</a:t>
+              <a:t>16/06/2020</a:t>
             </a:fld>
             <a:endParaRPr lang="en-US"/>
           </a:p>
@@ -2148,7 +2148,7 @@
           <a:p>
             <a:fld id="{7A805A2E-4434-7E48-B506-6CB9726E48D0}" type="datetimeFigureOut">
               <a:rPr lang="it-IT" smtClean="0"/>
-              <a:t>31/05/2020</a:t>
+              <a:t>16/06/2020</a:t>
             </a:fld>
             <a:endParaRPr lang="en-US"/>
           </a:p>
@@ -2330,7 +2330,7 @@
           <a:p>
             <a:fld id="{7A805A2E-4434-7E48-B506-6CB9726E48D0}" type="datetimeFigureOut">
               <a:rPr lang="it-IT" smtClean="0"/>
-              <a:t>31/05/2020</a:t>
+              <a:t>16/06/2020</a:t>
             </a:fld>
             <a:endParaRPr lang="en-US"/>
           </a:p>
@@ -2588,7 +2588,7 @@
           <a:p>
             <a:fld id="{7A805A2E-4434-7E48-B506-6CB9726E48D0}" type="datetimeFigureOut">
               <a:rPr lang="it-IT" smtClean="0"/>
-              <a:t>31/05/2020</a:t>
+              <a:t>16/06/2020</a:t>
             </a:fld>
             <a:endParaRPr lang="en-US"/>
           </a:p>
@@ -2888,7 +2888,7 @@
           <a:p>
             <a:fld id="{7A805A2E-4434-7E48-B506-6CB9726E48D0}" type="datetimeFigureOut">
               <a:rPr lang="it-IT" smtClean="0"/>
-              <a:t>31/05/2020</a:t>
+              <a:t>16/06/2020</a:t>
             </a:fld>
             <a:endParaRPr lang="en-US"/>
           </a:p>
@@ -3322,7 +3322,7 @@
           <a:p>
             <a:fld id="{7A805A2E-4434-7E48-B506-6CB9726E48D0}" type="datetimeFigureOut">
               <a:rPr lang="it-IT" smtClean="0"/>
-              <a:t>31/05/2020</a:t>
+              <a:t>16/06/2020</a:t>
             </a:fld>
             <a:endParaRPr lang="en-US"/>
           </a:p>
@@ -3452,7 +3452,7 @@
           <a:p>
             <a:fld id="{7A805A2E-4434-7E48-B506-6CB9726E48D0}" type="datetimeFigureOut">
               <a:rPr lang="it-IT" smtClean="0"/>
-              <a:t>31/05/2020</a:t>
+              <a:t>16/06/2020</a:t>
             </a:fld>
             <a:endParaRPr lang="en-US"/>
           </a:p>
@@ -3559,7 +3559,7 @@
           <a:p>
             <a:fld id="{7A805A2E-4434-7E48-B506-6CB9726E48D0}" type="datetimeFigureOut">
               <a:rPr lang="it-IT" smtClean="0"/>
-              <a:t>31/05/2020</a:t>
+              <a:t>16/06/2020</a:t>
             </a:fld>
             <a:endParaRPr lang="en-US"/>
           </a:p>
@@ -3848,7 +3848,7 @@
           <a:p>
             <a:fld id="{7A805A2E-4434-7E48-B506-6CB9726E48D0}" type="datetimeFigureOut">
               <a:rPr lang="it-IT" smtClean="0"/>
-              <a:t>31/05/2020</a:t>
+              <a:t>16/06/2020</a:t>
             </a:fld>
             <a:endParaRPr lang="en-US"/>
           </a:p>
@@ -4113,7 +4113,7 @@
           <a:p>
             <a:fld id="{7A805A2E-4434-7E48-B506-6CB9726E48D0}" type="datetimeFigureOut">
               <a:rPr lang="it-IT" smtClean="0"/>
-              <a:t>31/05/2020</a:t>
+              <a:t>16/06/2020</a:t>
             </a:fld>
             <a:endParaRPr lang="en-US"/>
           </a:p>
@@ -4338,7 +4338,7 @@
           <a:p>
             <a:fld id="{7A805A2E-4434-7E48-B506-6CB9726E48D0}" type="datetimeFigureOut">
               <a:rPr lang="it-IT" smtClean="0"/>
-              <a:t>31/05/2020</a:t>
+              <a:t>16/06/2020</a:t>
             </a:fld>
             <a:endParaRPr lang="en-US"/>
           </a:p>
@@ -4742,7 +4742,7 @@
           </a:xfrm>
           <a:extLst>
             <a:ext uri="{91240B29-F687-4f45-9708-019B960494DF}">
-              <a14:hiddenLine xmlns:a14="http://schemas.microsoft.com/office/drawing/2010/main" xmlns="" w="9525">
+              <a14:hiddenLine xmlns="" xmlns:a14="http://schemas.microsoft.com/office/drawing/2010/main" w="9525">
                 <a:solidFill>
                   <a:schemeClr val="accent2"/>
                 </a:solidFill>
@@ -5576,7 +5576,7 @@
             <a:r>
               <a:rPr lang="it-IT" sz="2800" dirty="0">
                 <a:solidFill>
-                  <a:srgbClr val="FFC000"/>
+                  <a:srgbClr val="00B050"/>
                 </a:solidFill>
               </a:rPr>
               <a:t>Possono usare il sistema due tipologie di attori: gli utenti registrati e l'amministratore</a:t>
@@ -5591,14 +5591,14 @@
             <a:r>
               <a:rPr lang="it-IT" sz="2800" dirty="0">
                 <a:solidFill>
-                  <a:srgbClr val="FFC000"/>
+                  <a:srgbClr val="00B050"/>
                 </a:solidFill>
               </a:rPr>
               <a:t>Gli utenti possono creare e gestire Progetti</a:t>
             </a:r>
             <a:endParaRPr lang="it-IT" sz="2400" dirty="0">
               <a:solidFill>
-                <a:srgbClr val="FFC000"/>
+                <a:srgbClr val="00B050"/>
               </a:solidFill>
             </a:endParaRPr>
           </a:p>
@@ -5611,14 +5611,14 @@
             <a:r>
               <a:rPr lang="it-IT" sz="2800" dirty="0">
                 <a:solidFill>
-                  <a:srgbClr val="FFC000"/>
+                  <a:srgbClr val="00B050"/>
                 </a:solidFill>
               </a:rPr>
               <a:t>L'amministratore può cancellare gli utenti e i loro progetti</a:t>
             </a:r>
             <a:endParaRPr lang="it-IT" sz="2400" dirty="0">
               <a:solidFill>
-                <a:srgbClr val="FFC000"/>
+                <a:srgbClr val="00B050"/>
               </a:solidFill>
             </a:endParaRPr>
           </a:p>
@@ -5800,7 +5800,11 @@
               <a:defRPr/>
             </a:pPr>
             <a:r>
-              <a:rPr lang="it-IT" sz="2000" dirty="0"/>
+              <a:rPr lang="it-IT" sz="2000" dirty="0">
+                <a:solidFill>
+                  <a:srgbClr val="00B050"/>
+                </a:solidFill>
+              </a:rPr>
               <a:t>si autentica sul sistema con un username (univoco) e password</a:t>
             </a:r>
           </a:p>
@@ -5812,7 +5816,11 @@
               <a:defRPr/>
             </a:pPr>
             <a:r>
-              <a:rPr lang="it-IT" sz="2000" dirty="0"/>
+              <a:rPr lang="it-IT" sz="2000" dirty="0">
+                <a:solidFill>
+                  <a:srgbClr val="00B050"/>
+                </a:solidFill>
+              </a:rPr>
               <a:t>può creare progetti</a:t>
             </a:r>
           </a:p>
@@ -5824,8 +5832,20 @@
               <a:defRPr/>
             </a:pPr>
             <a:r>
-              <a:rPr lang="it-IT" sz="2000" dirty="0"/>
-              <a:t>può aggiungere task ai propri progetti</a:t>
+              <a:rPr lang="it-IT" sz="2000" dirty="0">
+                <a:solidFill>
+                  <a:srgbClr val="00B050"/>
+                </a:solidFill>
+              </a:rPr>
+              <a:t>può aggiungere task </a:t>
+            </a:r>
+            <a:r>
+              <a:rPr lang="it-IT" sz="2000" dirty="0">
+                <a:solidFill>
+                  <a:srgbClr val="FFC000"/>
+                </a:solidFill>
+              </a:rPr>
+              <a:t>ai propri progetti</a:t>
             </a:r>
           </a:p>
           <a:p>
@@ -5836,8 +5856,28 @@
               <a:defRPr/>
             </a:pPr>
             <a:r>
-              <a:rPr lang="it-IT" sz="2000" dirty="0"/>
-              <a:t>può concedere la visibilità dei propri progetti ad altri utenti</a:t>
+              <a:rPr lang="it-IT" sz="2000" dirty="0">
+                <a:solidFill>
+                  <a:srgbClr val="00B050"/>
+                </a:solidFill>
+              </a:rPr>
+              <a:t>può concedere la visibilità </a:t>
+            </a:r>
+            <a:r>
+              <a:rPr lang="it-IT" sz="2000" dirty="0">
+                <a:solidFill>
+                  <a:srgbClr val="FFC000"/>
+                </a:solidFill>
+              </a:rPr>
+              <a:t>dei propri progetti </a:t>
+            </a:r>
+            <a:r>
+              <a:rPr lang="it-IT" sz="2000" dirty="0">
+                <a:solidFill>
+                  <a:srgbClr val="00B050"/>
+                </a:solidFill>
+              </a:rPr>
+              <a:t>ad altri utenti</a:t>
             </a:r>
           </a:p>
           <a:p>
@@ -6032,7 +6072,11 @@
               <a:defRPr/>
             </a:pPr>
             <a:r>
-              <a:rPr lang="it-IT" sz="2000" dirty="0"/>
+              <a:rPr lang="it-IT" sz="2000" dirty="0">
+                <a:solidFill>
+                  <a:srgbClr val="FFC000"/>
+                </a:solidFill>
+              </a:rPr>
               <a:t>Solo l'utente proprietario del progetto può effettuare l'assegnazione dei Tag al Task</a:t>
             </a:r>
           </a:p>
@@ -6046,10 +6090,18 @@
             <a:r>
               <a:rPr lang="it-IT" sz="2400" dirty="0">
                 <a:solidFill>
+                  <a:srgbClr val="FFC000"/>
+                </a:solidFill>
+              </a:rPr>
+              <a:t>Ogni utente che abbia visibilità di un progetto </a:t>
+            </a:r>
+            <a:r>
+              <a:rPr lang="it-IT" sz="2400" dirty="0">
+                <a:solidFill>
                   <a:srgbClr val="00B050"/>
                 </a:solidFill>
               </a:rPr>
-              <a:t>Ogni utente che abbia visibilità di un progetto può scrivere uno o più Commenti sotto qualsiasi Task di quel progetto</a:t>
+              <a:t>può scrivere uno o più Commenti sotto qualsiasi Task di quel progetto</a:t>
             </a:r>
             <a:endParaRPr lang="en-US" sz="2400" dirty="0">
               <a:solidFill>
@@ -6255,10 +6307,18 @@
               </a:lnSpc>
             </a:pPr>
             <a:r>
-              <a:rPr lang="it-IT" dirty="0" err="1"/>
+              <a:rPr lang="it-IT" dirty="0" err="1">
+                <a:solidFill>
+                  <a:srgbClr val="00B050"/>
+                </a:solidFill>
+              </a:rPr>
               <a:t>Signup</a:t>
             </a:r>
-            <a:endParaRPr lang="it-IT" dirty="0"/>
+            <a:endParaRPr lang="it-IT" dirty="0">
+              <a:solidFill>
+                <a:srgbClr val="00B050"/>
+              </a:solidFill>
+            </a:endParaRPr>
           </a:p>
           <a:p>
             <a:pPr>
@@ -6267,7 +6327,11 @@
               </a:lnSpc>
             </a:pPr>
             <a:r>
-              <a:rPr lang="it-IT" dirty="0"/>
+              <a:rPr lang="it-IT" dirty="0">
+                <a:solidFill>
+                  <a:srgbClr val="00B050"/>
+                </a:solidFill>
+              </a:rPr>
               <a:t>Autenticazione</a:t>
             </a:r>
           </a:p>
@@ -6278,7 +6342,11 @@
               </a:lnSpc>
             </a:pPr>
             <a:r>
-              <a:rPr lang="it-IT" dirty="0"/>
+              <a:rPr lang="it-IT" dirty="0">
+                <a:solidFill>
+                  <a:srgbClr val="00B050"/>
+                </a:solidFill>
+              </a:rPr>
               <a:t>Visualizzare il mio profilo</a:t>
             </a:r>
           </a:p>
@@ -6289,7 +6357,11 @@
               </a:lnSpc>
             </a:pPr>
             <a:r>
-              <a:rPr lang="it-IT" dirty="0"/>
+              <a:rPr lang="it-IT" dirty="0">
+                <a:solidFill>
+                  <a:srgbClr val="FFC000"/>
+                </a:solidFill>
+              </a:rPr>
               <a:t>Aggiornare il mio profilo</a:t>
             </a:r>
           </a:p>
@@ -6399,7 +6471,11 @@
               </a:lnSpc>
             </a:pPr>
             <a:r>
-              <a:rPr lang="it-IT" dirty="0"/>
+              <a:rPr lang="it-IT" dirty="0">
+                <a:solidFill>
+                  <a:srgbClr val="00B050"/>
+                </a:solidFill>
+              </a:rPr>
               <a:t>Creare un nuovo progetto</a:t>
             </a:r>
           </a:p>
@@ -6410,10 +6486,18 @@
               </a:lnSpc>
             </a:pPr>
             <a:r>
-              <a:rPr lang="it-IT" dirty="0"/>
+              <a:rPr lang="it-IT" dirty="0">
+                <a:solidFill>
+                  <a:srgbClr val="00B050"/>
+                </a:solidFill>
+              </a:rPr>
               <a:t>Visualizzare i miei progetti</a:t>
             </a:r>
-            <a:endParaRPr lang="it-IT" b="1" dirty="0"/>
+            <a:endParaRPr lang="it-IT" b="1" dirty="0">
+              <a:solidFill>
+                <a:srgbClr val="00B050"/>
+              </a:solidFill>
+            </a:endParaRPr>
           </a:p>
           <a:p>
             <a:pPr>
@@ -6422,10 +6506,18 @@
               </a:lnSpc>
             </a:pPr>
             <a:r>
-              <a:rPr lang="it-IT" dirty="0"/>
+              <a:rPr lang="it-IT" dirty="0">
+                <a:solidFill>
+                  <a:srgbClr val="00B050"/>
+                </a:solidFill>
+              </a:rPr>
               <a:t>Visualizzare i progetti condivisi con me</a:t>
             </a:r>
-            <a:endParaRPr lang="it-IT" b="1" dirty="0"/>
+            <a:endParaRPr lang="it-IT" b="1" dirty="0">
+              <a:solidFill>
+                <a:srgbClr val="00B050"/>
+              </a:solidFill>
+            </a:endParaRPr>
           </a:p>
           <a:p>
             <a:pPr>
@@ -6434,7 +6526,11 @@
               </a:lnSpc>
             </a:pPr>
             <a:r>
-              <a:rPr lang="it-IT" dirty="0"/>
+              <a:rPr lang="it-IT" dirty="0">
+                <a:solidFill>
+                  <a:srgbClr val="FFC000"/>
+                </a:solidFill>
+              </a:rPr>
               <a:t>Aggiornare i dati di un mio progetto</a:t>
             </a:r>
           </a:p>
@@ -6445,7 +6541,11 @@
               </a:lnSpc>
             </a:pPr>
             <a:r>
-              <a:rPr lang="it-IT" dirty="0"/>
+              <a:rPr lang="it-IT" dirty="0">
+                <a:solidFill>
+                  <a:srgbClr val="00B050"/>
+                </a:solidFill>
+              </a:rPr>
               <a:t>Cancellare un mio progetto</a:t>
             </a:r>
           </a:p>
@@ -6456,7 +6556,11 @@
               </a:lnSpc>
             </a:pPr>
             <a:r>
-              <a:rPr lang="it-IT" dirty="0"/>
+              <a:rPr lang="it-IT" dirty="0">
+                <a:solidFill>
+                  <a:srgbClr val="00B050"/>
+                </a:solidFill>
+              </a:rPr>
               <a:t>Condividere un mio progetto con un altro utente</a:t>
             </a:r>
           </a:p>
@@ -6467,15 +6571,27 @@
               </a:lnSpc>
             </a:pPr>
             <a:r>
-              <a:rPr lang="it-IT" dirty="0"/>
+              <a:rPr lang="it-IT" dirty="0">
+                <a:solidFill>
+                  <a:srgbClr val="00B050"/>
+                </a:solidFill>
+              </a:rPr>
               <a:t>Aggiungere un </a:t>
             </a:r>
             <a:r>
-              <a:rPr lang="it-IT" dirty="0" err="1"/>
+              <a:rPr lang="it-IT" dirty="0" err="1">
+                <a:solidFill>
+                  <a:srgbClr val="00B050"/>
+                </a:solidFill>
+              </a:rPr>
               <a:t>tag</a:t>
             </a:r>
             <a:r>
-              <a:rPr lang="it-IT" dirty="0"/>
+              <a:rPr lang="it-IT" dirty="0">
+                <a:solidFill>
+                  <a:srgbClr val="00B050"/>
+                </a:solidFill>
+              </a:rPr>
               <a:t> ad un mio progetto (estensione)</a:t>
             </a:r>
           </a:p>
@@ -6485,7 +6601,11 @@
                 <a:spcPct val="150000"/>
               </a:lnSpc>
             </a:pPr>
-            <a:endParaRPr lang="it-IT" sz="1800" dirty="0"/>
+            <a:endParaRPr lang="it-IT" sz="1800" dirty="0">
+              <a:solidFill>
+                <a:srgbClr val="00B050"/>
+              </a:solidFill>
+            </a:endParaRPr>
           </a:p>
           <a:p>
             <a:pPr>
@@ -6601,7 +6721,11 @@
               </a:lnSpc>
             </a:pPr>
             <a:r>
-              <a:rPr lang="it-IT" dirty="0"/>
+              <a:rPr lang="it-IT" dirty="0">
+                <a:solidFill>
+                  <a:srgbClr val="00B050"/>
+                </a:solidFill>
+              </a:rPr>
               <a:t>Aggiungere un nuovo Task a un mio progetto</a:t>
             </a:r>
           </a:p>
@@ -6612,10 +6736,18 @@
               </a:lnSpc>
             </a:pPr>
             <a:r>
-              <a:rPr lang="it-IT" dirty="0"/>
+              <a:rPr lang="it-IT" dirty="0">
+                <a:solidFill>
+                  <a:srgbClr val="FFC000"/>
+                </a:solidFill>
+              </a:rPr>
               <a:t>Aggiornare un Task di un mio progetto</a:t>
             </a:r>
-            <a:endParaRPr lang="it-IT" sz="2100" dirty="0"/>
+            <a:endParaRPr lang="it-IT" sz="2100" dirty="0">
+              <a:solidFill>
+                <a:srgbClr val="FFC000"/>
+              </a:solidFill>
+            </a:endParaRPr>
           </a:p>
           <a:p>
             <a:pPr>
@@ -6624,7 +6756,11 @@
               </a:lnSpc>
             </a:pPr>
             <a:r>
-              <a:rPr lang="it-IT" dirty="0"/>
+              <a:rPr lang="it-IT" dirty="0">
+                <a:solidFill>
+                  <a:srgbClr val="00B050"/>
+                </a:solidFill>
+              </a:rPr>
               <a:t>Cancellare un Task da un mio progetto</a:t>
             </a:r>
           </a:p>
@@ -6635,7 +6771,11 @@
               </a:lnSpc>
             </a:pPr>
             <a:r>
-              <a:rPr lang="it-IT" dirty="0"/>
+              <a:rPr lang="it-IT" dirty="0">
+                <a:solidFill>
+                  <a:srgbClr val="FFC000"/>
+                </a:solidFill>
+              </a:rPr>
               <a:t>Assegnare un Task di un mio progetto ad un utente che ha visibilità sul mio progetto</a:t>
             </a:r>
           </a:p>
@@ -6646,8 +6786,28 @@
               </a:lnSpc>
             </a:pPr>
             <a:r>
-              <a:rPr lang="it-IT" dirty="0"/>
-              <a:t>Aggiungere un Tag ad un task di un mio progetto (estensione)</a:t>
+              <a:rPr lang="it-IT" dirty="0">
+                <a:solidFill>
+                  <a:srgbClr val="00B050"/>
+                </a:solidFill>
+              </a:rPr>
+              <a:t>Aggiungere un Tag ad un task </a:t>
+            </a:r>
+            <a:r>
+              <a:rPr lang="it-IT" dirty="0">
+                <a:solidFill>
+                  <a:srgbClr val="FFC000"/>
+                </a:solidFill>
+              </a:rPr>
+              <a:t>di un mio progetto </a:t>
+            </a:r>
+            <a:r>
+              <a:rPr lang="it-IT" dirty="0">
+                <a:solidFill>
+                  <a:srgbClr val="00B050"/>
+                </a:solidFill>
+              </a:rPr>
+              <a:t>(estensione)</a:t>
             </a:r>
           </a:p>
           <a:p>
@@ -6657,8 +6817,24 @@
               </a:lnSpc>
             </a:pPr>
             <a:r>
+              <a:rPr lang="it-IT" dirty="0">
+                <a:solidFill>
+                  <a:srgbClr val="00B050"/>
+                </a:solidFill>
+              </a:rPr>
+              <a:t>Aggiungere un Commento ad un Task di un progetto </a:t>
+            </a:r>
+            <a:r>
+              <a:rPr lang="it-IT" dirty="0">
+                <a:solidFill>
+                  <a:srgbClr val="FFC000"/>
+                </a:solidFill>
+              </a:rPr>
+              <a:t>su cui ho visibilità </a:t>
+            </a:r>
+            <a:r>
               <a:rPr lang="it-IT" dirty="0"/>
-              <a:t>Aggiungere un Commento ad un Task di un progetto su cui ho visibilità (estensione)</a:t>
+              <a:t>(estensione)</a:t>
             </a:r>
           </a:p>
         </p:txBody>

</xml_diff>

<commit_message>
Revert "modificati alcuni riferimenti delle request (resi coerenti con il relativo controller)"
This reverts commit 8b2e2430129a15c1770c7d51c21ae3ee40c8ed49.
</commit_message>
<xml_diff>
--- a/Direttive progetto e class diagram/siw-progetto-giugno-2020.pptx
+++ b/Direttive progetto e class diagram/siw-progetto-giugno-2020.pptx
@@ -218,7 +218,7 @@
           <a:p>
             <a:fld id="{6AF75452-8E9B-2A4A-993A-81C6082A6AE5}" type="datetimeFigureOut">
               <a:rPr lang="it-IT" smtClean="0"/>
-              <a:t>16/06/2020</a:t>
+              <a:t>31/05/2020</a:t>
             </a:fld>
             <a:endParaRPr lang="en-US"/>
           </a:p>
@@ -518,14 +518,14 @@
           <a:ln/>
           <a:extLst>
             <a:ext uri="{909E8E84-426E-40dd-AFC4-6F175D3DCCD1}">
-              <a14:hiddenFill xmlns="" xmlns:a14="http://schemas.microsoft.com/office/drawing/2010/main">
+              <a14:hiddenFill xmlns:a14="http://schemas.microsoft.com/office/drawing/2010/main" xmlns="">
                 <a:solidFill>
                   <a:srgbClr val="FFFFFF"/>
                 </a:solidFill>
               </a14:hiddenFill>
             </a:ext>
             <a:ext uri="{91240B29-F687-4f45-9708-019B960494DF}">
-              <a14:hiddenLine xmlns="" xmlns:a14="http://schemas.microsoft.com/office/drawing/2010/main" w="9525">
+              <a14:hiddenLine xmlns:a14="http://schemas.microsoft.com/office/drawing/2010/main" xmlns="" w="9525">
                 <a:solidFill>
                   <a:srgbClr val="000000"/>
                 </a:solidFill>
@@ -685,14 +685,14 @@
           <a:ln/>
           <a:extLst>
             <a:ext uri="{909E8E84-426E-40dd-AFC4-6F175D3DCCD1}">
-              <a14:hiddenFill xmlns="" xmlns:a14="http://schemas.microsoft.com/office/drawing/2010/main">
+              <a14:hiddenFill xmlns:a14="http://schemas.microsoft.com/office/drawing/2010/main" xmlns="">
                 <a:solidFill>
                   <a:srgbClr val="FFFFFF"/>
                 </a:solidFill>
               </a14:hiddenFill>
             </a:ext>
             <a:ext uri="{91240B29-F687-4f45-9708-019B960494DF}">
-              <a14:hiddenLine xmlns="" xmlns:a14="http://schemas.microsoft.com/office/drawing/2010/main" w="9525">
+              <a14:hiddenLine xmlns:a14="http://schemas.microsoft.com/office/drawing/2010/main" xmlns="" w="9525">
                 <a:solidFill>
                   <a:srgbClr val="000000"/>
                 </a:solidFill>
@@ -702,7 +702,7 @@
               </a14:hiddenLine>
             </a:ext>
             <a:ext uri="{FAA26D3D-D897-4be2-8F04-BA451C77F1D7}">
-              <ma14:placeholderFlag xmlns="" xmlns:ma14="http://schemas.microsoft.com/office/mac/drawingml/2011/main" val="1"/>
+              <ma14:placeholderFlag xmlns:ma14="http://schemas.microsoft.com/office/mac/drawingml/2011/main" xmlns="" val="1"/>
             </a:ext>
           </a:extLst>
         </p:spPr>
@@ -755,14 +755,14 @@
           <a:ln/>
           <a:extLst>
             <a:ext uri="{909E8E84-426E-40dd-AFC4-6F175D3DCCD1}">
-              <a14:hiddenFill xmlns="" xmlns:a14="http://schemas.microsoft.com/office/drawing/2010/main">
+              <a14:hiddenFill xmlns:a14="http://schemas.microsoft.com/office/drawing/2010/main" xmlns="">
                 <a:solidFill>
                   <a:srgbClr val="FFFFFF"/>
                 </a:solidFill>
               </a14:hiddenFill>
             </a:ext>
             <a:ext uri="{91240B29-F687-4f45-9708-019B960494DF}">
-              <a14:hiddenLine xmlns="" xmlns:a14="http://schemas.microsoft.com/office/drawing/2010/main" w="9525">
+              <a14:hiddenLine xmlns:a14="http://schemas.microsoft.com/office/drawing/2010/main" xmlns="" w="9525">
                 <a:solidFill>
                   <a:srgbClr val="000000"/>
                 </a:solidFill>
@@ -923,14 +923,14 @@
           <a:ln/>
           <a:extLst>
             <a:ext uri="{909E8E84-426E-40dd-AFC4-6F175D3DCCD1}">
-              <a14:hiddenFill xmlns="" xmlns:a14="http://schemas.microsoft.com/office/drawing/2010/main">
+              <a14:hiddenFill xmlns:a14="http://schemas.microsoft.com/office/drawing/2010/main" xmlns="">
                 <a:solidFill>
                   <a:srgbClr val="FFFFFF"/>
                 </a:solidFill>
               </a14:hiddenFill>
             </a:ext>
             <a:ext uri="{91240B29-F687-4f45-9708-019B960494DF}">
-              <a14:hiddenLine xmlns="" xmlns:a14="http://schemas.microsoft.com/office/drawing/2010/main" w="9525">
+              <a14:hiddenLine xmlns:a14="http://schemas.microsoft.com/office/drawing/2010/main" xmlns="" w="9525">
                 <a:solidFill>
                   <a:srgbClr val="000000"/>
                 </a:solidFill>
@@ -940,7 +940,7 @@
               </a14:hiddenLine>
             </a:ext>
             <a:ext uri="{FAA26D3D-D897-4be2-8F04-BA451C77F1D7}">
-              <ma14:placeholderFlag xmlns="" xmlns:ma14="http://schemas.microsoft.com/office/mac/drawingml/2011/main" val="1"/>
+              <ma14:placeholderFlag xmlns:ma14="http://schemas.microsoft.com/office/mac/drawingml/2011/main" xmlns="" val="1"/>
             </a:ext>
           </a:extLst>
         </p:spPr>
@@ -993,14 +993,14 @@
           <a:ln/>
           <a:extLst>
             <a:ext uri="{909E8E84-426E-40dd-AFC4-6F175D3DCCD1}">
-              <a14:hiddenFill xmlns="" xmlns:a14="http://schemas.microsoft.com/office/drawing/2010/main">
+              <a14:hiddenFill xmlns:a14="http://schemas.microsoft.com/office/drawing/2010/main" xmlns="">
                 <a:solidFill>
                   <a:srgbClr val="FFFFFF"/>
                 </a:solidFill>
               </a14:hiddenFill>
             </a:ext>
             <a:ext uri="{91240B29-F687-4f45-9708-019B960494DF}">
-              <a14:hiddenLine xmlns="" xmlns:a14="http://schemas.microsoft.com/office/drawing/2010/main" w="9525">
+              <a14:hiddenLine xmlns:a14="http://schemas.microsoft.com/office/drawing/2010/main" xmlns="" w="9525">
                 <a:solidFill>
                   <a:srgbClr val="000000"/>
                 </a:solidFill>
@@ -1161,14 +1161,14 @@
           <a:ln/>
           <a:extLst>
             <a:ext uri="{909E8E84-426E-40dd-AFC4-6F175D3DCCD1}">
-              <a14:hiddenFill xmlns="" xmlns:a14="http://schemas.microsoft.com/office/drawing/2010/main">
+              <a14:hiddenFill xmlns:a14="http://schemas.microsoft.com/office/drawing/2010/main" xmlns="">
                 <a:solidFill>
                   <a:srgbClr val="FFFFFF"/>
                 </a:solidFill>
               </a14:hiddenFill>
             </a:ext>
             <a:ext uri="{91240B29-F687-4f45-9708-019B960494DF}">
-              <a14:hiddenLine xmlns="" xmlns:a14="http://schemas.microsoft.com/office/drawing/2010/main" w="9525">
+              <a14:hiddenLine xmlns:a14="http://schemas.microsoft.com/office/drawing/2010/main" xmlns="" w="9525">
                 <a:solidFill>
                   <a:srgbClr val="000000"/>
                 </a:solidFill>
@@ -1178,7 +1178,7 @@
               </a14:hiddenLine>
             </a:ext>
             <a:ext uri="{FAA26D3D-D897-4be2-8F04-BA451C77F1D7}">
-              <ma14:placeholderFlag xmlns="" xmlns:ma14="http://schemas.microsoft.com/office/mac/drawingml/2011/main" val="1"/>
+              <ma14:placeholderFlag xmlns:ma14="http://schemas.microsoft.com/office/mac/drawingml/2011/main" xmlns="" val="1"/>
             </a:ext>
           </a:extLst>
         </p:spPr>
@@ -1774,7 +1774,7 @@
           <a:p>
             <a:fld id="{7A805A2E-4434-7E48-B506-6CB9726E48D0}" type="datetimeFigureOut">
               <a:rPr lang="it-IT" smtClean="0"/>
-              <a:t>16/06/2020</a:t>
+              <a:t>31/05/2020</a:t>
             </a:fld>
             <a:endParaRPr lang="en-US"/>
           </a:p>
@@ -1956,7 +1956,7 @@
           <a:p>
             <a:fld id="{7A805A2E-4434-7E48-B506-6CB9726E48D0}" type="datetimeFigureOut">
               <a:rPr lang="it-IT" smtClean="0"/>
-              <a:t>16/06/2020</a:t>
+              <a:t>31/05/2020</a:t>
             </a:fld>
             <a:endParaRPr lang="en-US"/>
           </a:p>
@@ -2148,7 +2148,7 @@
           <a:p>
             <a:fld id="{7A805A2E-4434-7E48-B506-6CB9726E48D0}" type="datetimeFigureOut">
               <a:rPr lang="it-IT" smtClean="0"/>
-              <a:t>16/06/2020</a:t>
+              <a:t>31/05/2020</a:t>
             </a:fld>
             <a:endParaRPr lang="en-US"/>
           </a:p>
@@ -2330,7 +2330,7 @@
           <a:p>
             <a:fld id="{7A805A2E-4434-7E48-B506-6CB9726E48D0}" type="datetimeFigureOut">
               <a:rPr lang="it-IT" smtClean="0"/>
-              <a:t>16/06/2020</a:t>
+              <a:t>31/05/2020</a:t>
             </a:fld>
             <a:endParaRPr lang="en-US"/>
           </a:p>
@@ -2588,7 +2588,7 @@
           <a:p>
             <a:fld id="{7A805A2E-4434-7E48-B506-6CB9726E48D0}" type="datetimeFigureOut">
               <a:rPr lang="it-IT" smtClean="0"/>
-              <a:t>16/06/2020</a:t>
+              <a:t>31/05/2020</a:t>
             </a:fld>
             <a:endParaRPr lang="en-US"/>
           </a:p>
@@ -2888,7 +2888,7 @@
           <a:p>
             <a:fld id="{7A805A2E-4434-7E48-B506-6CB9726E48D0}" type="datetimeFigureOut">
               <a:rPr lang="it-IT" smtClean="0"/>
-              <a:t>16/06/2020</a:t>
+              <a:t>31/05/2020</a:t>
             </a:fld>
             <a:endParaRPr lang="en-US"/>
           </a:p>
@@ -3322,7 +3322,7 @@
           <a:p>
             <a:fld id="{7A805A2E-4434-7E48-B506-6CB9726E48D0}" type="datetimeFigureOut">
               <a:rPr lang="it-IT" smtClean="0"/>
-              <a:t>16/06/2020</a:t>
+              <a:t>31/05/2020</a:t>
             </a:fld>
             <a:endParaRPr lang="en-US"/>
           </a:p>
@@ -3452,7 +3452,7 @@
           <a:p>
             <a:fld id="{7A805A2E-4434-7E48-B506-6CB9726E48D0}" type="datetimeFigureOut">
               <a:rPr lang="it-IT" smtClean="0"/>
-              <a:t>16/06/2020</a:t>
+              <a:t>31/05/2020</a:t>
             </a:fld>
             <a:endParaRPr lang="en-US"/>
           </a:p>
@@ -3559,7 +3559,7 @@
           <a:p>
             <a:fld id="{7A805A2E-4434-7E48-B506-6CB9726E48D0}" type="datetimeFigureOut">
               <a:rPr lang="it-IT" smtClean="0"/>
-              <a:t>16/06/2020</a:t>
+              <a:t>31/05/2020</a:t>
             </a:fld>
             <a:endParaRPr lang="en-US"/>
           </a:p>
@@ -3848,7 +3848,7 @@
           <a:p>
             <a:fld id="{7A805A2E-4434-7E48-B506-6CB9726E48D0}" type="datetimeFigureOut">
               <a:rPr lang="it-IT" smtClean="0"/>
-              <a:t>16/06/2020</a:t>
+              <a:t>31/05/2020</a:t>
             </a:fld>
             <a:endParaRPr lang="en-US"/>
           </a:p>
@@ -4113,7 +4113,7 @@
           <a:p>
             <a:fld id="{7A805A2E-4434-7E48-B506-6CB9726E48D0}" type="datetimeFigureOut">
               <a:rPr lang="it-IT" smtClean="0"/>
-              <a:t>16/06/2020</a:t>
+              <a:t>31/05/2020</a:t>
             </a:fld>
             <a:endParaRPr lang="en-US"/>
           </a:p>
@@ -4338,7 +4338,7 @@
           <a:p>
             <a:fld id="{7A805A2E-4434-7E48-B506-6CB9726E48D0}" type="datetimeFigureOut">
               <a:rPr lang="it-IT" smtClean="0"/>
-              <a:t>16/06/2020</a:t>
+              <a:t>31/05/2020</a:t>
             </a:fld>
             <a:endParaRPr lang="en-US"/>
           </a:p>
@@ -4742,7 +4742,7 @@
           </a:xfrm>
           <a:extLst>
             <a:ext uri="{91240B29-F687-4f45-9708-019B960494DF}">
-              <a14:hiddenLine xmlns="" xmlns:a14="http://schemas.microsoft.com/office/drawing/2010/main" w="9525">
+              <a14:hiddenLine xmlns:a14="http://schemas.microsoft.com/office/drawing/2010/main" xmlns="" w="9525">
                 <a:solidFill>
                   <a:schemeClr val="accent2"/>
                 </a:solidFill>
@@ -5576,7 +5576,7 @@
             <a:r>
               <a:rPr lang="it-IT" sz="2800" dirty="0">
                 <a:solidFill>
-                  <a:srgbClr val="00B050"/>
+                  <a:srgbClr val="FFC000"/>
                 </a:solidFill>
               </a:rPr>
               <a:t>Possono usare il sistema due tipologie di attori: gli utenti registrati e l'amministratore</a:t>
@@ -5591,14 +5591,14 @@
             <a:r>
               <a:rPr lang="it-IT" sz="2800" dirty="0">
                 <a:solidFill>
-                  <a:srgbClr val="00B050"/>
+                  <a:srgbClr val="FFC000"/>
                 </a:solidFill>
               </a:rPr>
               <a:t>Gli utenti possono creare e gestire Progetti</a:t>
             </a:r>
             <a:endParaRPr lang="it-IT" sz="2400" dirty="0">
               <a:solidFill>
-                <a:srgbClr val="00B050"/>
+                <a:srgbClr val="FFC000"/>
               </a:solidFill>
             </a:endParaRPr>
           </a:p>
@@ -5611,14 +5611,14 @@
             <a:r>
               <a:rPr lang="it-IT" sz="2800" dirty="0">
                 <a:solidFill>
-                  <a:srgbClr val="00B050"/>
+                  <a:srgbClr val="FFC000"/>
                 </a:solidFill>
               </a:rPr>
               <a:t>L'amministratore può cancellare gli utenti e i loro progetti</a:t>
             </a:r>
             <a:endParaRPr lang="it-IT" sz="2400" dirty="0">
               <a:solidFill>
-                <a:srgbClr val="00B050"/>
+                <a:srgbClr val="FFC000"/>
               </a:solidFill>
             </a:endParaRPr>
           </a:p>
@@ -5800,11 +5800,7 @@
               <a:defRPr/>
             </a:pPr>
             <a:r>
-              <a:rPr lang="it-IT" sz="2000" dirty="0">
-                <a:solidFill>
-                  <a:srgbClr val="00B050"/>
-                </a:solidFill>
-              </a:rPr>
+              <a:rPr lang="it-IT" sz="2000" dirty="0"/>
               <a:t>si autentica sul sistema con un username (univoco) e password</a:t>
             </a:r>
           </a:p>
@@ -5816,11 +5812,7 @@
               <a:defRPr/>
             </a:pPr>
             <a:r>
-              <a:rPr lang="it-IT" sz="2000" dirty="0">
-                <a:solidFill>
-                  <a:srgbClr val="00B050"/>
-                </a:solidFill>
-              </a:rPr>
+              <a:rPr lang="it-IT" sz="2000" dirty="0"/>
               <a:t>può creare progetti</a:t>
             </a:r>
           </a:p>
@@ -5832,20 +5824,8 @@
               <a:defRPr/>
             </a:pPr>
             <a:r>
-              <a:rPr lang="it-IT" sz="2000" dirty="0">
-                <a:solidFill>
-                  <a:srgbClr val="00B050"/>
-                </a:solidFill>
-              </a:rPr>
-              <a:t>può aggiungere task </a:t>
-            </a:r>
-            <a:r>
-              <a:rPr lang="it-IT" sz="2000" dirty="0">
-                <a:solidFill>
-                  <a:srgbClr val="FFC000"/>
-                </a:solidFill>
-              </a:rPr>
-              <a:t>ai propri progetti</a:t>
+              <a:rPr lang="it-IT" sz="2000" dirty="0"/>
+              <a:t>può aggiungere task ai propri progetti</a:t>
             </a:r>
           </a:p>
           <a:p>
@@ -5856,28 +5836,8 @@
               <a:defRPr/>
             </a:pPr>
             <a:r>
-              <a:rPr lang="it-IT" sz="2000" dirty="0">
-                <a:solidFill>
-                  <a:srgbClr val="00B050"/>
-                </a:solidFill>
-              </a:rPr>
-              <a:t>può concedere la visibilità </a:t>
-            </a:r>
-            <a:r>
-              <a:rPr lang="it-IT" sz="2000" dirty="0">
-                <a:solidFill>
-                  <a:srgbClr val="FFC000"/>
-                </a:solidFill>
-              </a:rPr>
-              <a:t>dei propri progetti </a:t>
-            </a:r>
-            <a:r>
-              <a:rPr lang="it-IT" sz="2000" dirty="0">
-                <a:solidFill>
-                  <a:srgbClr val="00B050"/>
-                </a:solidFill>
-              </a:rPr>
-              <a:t>ad altri utenti</a:t>
+              <a:rPr lang="it-IT" sz="2000" dirty="0"/>
+              <a:t>può concedere la visibilità dei propri progetti ad altri utenti</a:t>
             </a:r>
           </a:p>
           <a:p>
@@ -6072,11 +6032,7 @@
               <a:defRPr/>
             </a:pPr>
             <a:r>
-              <a:rPr lang="it-IT" sz="2000" dirty="0">
-                <a:solidFill>
-                  <a:srgbClr val="FFC000"/>
-                </a:solidFill>
-              </a:rPr>
+              <a:rPr lang="it-IT" sz="2000" dirty="0"/>
               <a:t>Solo l'utente proprietario del progetto può effettuare l'assegnazione dei Tag al Task</a:t>
             </a:r>
           </a:p>
@@ -6090,18 +6046,10 @@
             <a:r>
               <a:rPr lang="it-IT" sz="2400" dirty="0">
                 <a:solidFill>
-                  <a:srgbClr val="FFC000"/>
+                  <a:srgbClr val="00B050"/>
                 </a:solidFill>
               </a:rPr>
-              <a:t>Ogni utente che abbia visibilità di un progetto </a:t>
-            </a:r>
-            <a:r>
-              <a:rPr lang="it-IT" sz="2400" dirty="0">
-                <a:solidFill>
-                  <a:srgbClr val="00B050"/>
-                </a:solidFill>
-              </a:rPr>
-              <a:t>può scrivere uno o più Commenti sotto qualsiasi Task di quel progetto</a:t>
+              <a:t>Ogni utente che abbia visibilità di un progetto può scrivere uno o più Commenti sotto qualsiasi Task di quel progetto</a:t>
             </a:r>
             <a:endParaRPr lang="en-US" sz="2400" dirty="0">
               <a:solidFill>
@@ -6307,18 +6255,10 @@
               </a:lnSpc>
             </a:pPr>
             <a:r>
-              <a:rPr lang="it-IT" dirty="0" err="1">
-                <a:solidFill>
-                  <a:srgbClr val="00B050"/>
-                </a:solidFill>
-              </a:rPr>
+              <a:rPr lang="it-IT" dirty="0" err="1"/>
               <a:t>Signup</a:t>
             </a:r>
-            <a:endParaRPr lang="it-IT" dirty="0">
-              <a:solidFill>
-                <a:srgbClr val="00B050"/>
-              </a:solidFill>
-            </a:endParaRPr>
+            <a:endParaRPr lang="it-IT" dirty="0"/>
           </a:p>
           <a:p>
             <a:pPr>
@@ -6327,11 +6267,7 @@
               </a:lnSpc>
             </a:pPr>
             <a:r>
-              <a:rPr lang="it-IT" dirty="0">
-                <a:solidFill>
-                  <a:srgbClr val="00B050"/>
-                </a:solidFill>
-              </a:rPr>
+              <a:rPr lang="it-IT" dirty="0"/>
               <a:t>Autenticazione</a:t>
             </a:r>
           </a:p>
@@ -6342,11 +6278,7 @@
               </a:lnSpc>
             </a:pPr>
             <a:r>
-              <a:rPr lang="it-IT" dirty="0">
-                <a:solidFill>
-                  <a:srgbClr val="00B050"/>
-                </a:solidFill>
-              </a:rPr>
+              <a:rPr lang="it-IT" dirty="0"/>
               <a:t>Visualizzare il mio profilo</a:t>
             </a:r>
           </a:p>
@@ -6357,11 +6289,7 @@
               </a:lnSpc>
             </a:pPr>
             <a:r>
-              <a:rPr lang="it-IT" dirty="0">
-                <a:solidFill>
-                  <a:srgbClr val="FFC000"/>
-                </a:solidFill>
-              </a:rPr>
+              <a:rPr lang="it-IT" dirty="0"/>
               <a:t>Aggiornare il mio profilo</a:t>
             </a:r>
           </a:p>
@@ -6471,11 +6399,7 @@
               </a:lnSpc>
             </a:pPr>
             <a:r>
-              <a:rPr lang="it-IT" dirty="0">
-                <a:solidFill>
-                  <a:srgbClr val="00B050"/>
-                </a:solidFill>
-              </a:rPr>
+              <a:rPr lang="it-IT" dirty="0"/>
               <a:t>Creare un nuovo progetto</a:t>
             </a:r>
           </a:p>
@@ -6486,18 +6410,10 @@
               </a:lnSpc>
             </a:pPr>
             <a:r>
-              <a:rPr lang="it-IT" dirty="0">
-                <a:solidFill>
-                  <a:srgbClr val="00B050"/>
-                </a:solidFill>
-              </a:rPr>
+              <a:rPr lang="it-IT" dirty="0"/>
               <a:t>Visualizzare i miei progetti</a:t>
             </a:r>
-            <a:endParaRPr lang="it-IT" b="1" dirty="0">
-              <a:solidFill>
-                <a:srgbClr val="00B050"/>
-              </a:solidFill>
-            </a:endParaRPr>
+            <a:endParaRPr lang="it-IT" b="1" dirty="0"/>
           </a:p>
           <a:p>
             <a:pPr>
@@ -6506,18 +6422,10 @@
               </a:lnSpc>
             </a:pPr>
             <a:r>
-              <a:rPr lang="it-IT" dirty="0">
-                <a:solidFill>
-                  <a:srgbClr val="00B050"/>
-                </a:solidFill>
-              </a:rPr>
+              <a:rPr lang="it-IT" dirty="0"/>
               <a:t>Visualizzare i progetti condivisi con me</a:t>
             </a:r>
-            <a:endParaRPr lang="it-IT" b="1" dirty="0">
-              <a:solidFill>
-                <a:srgbClr val="00B050"/>
-              </a:solidFill>
-            </a:endParaRPr>
+            <a:endParaRPr lang="it-IT" b="1" dirty="0"/>
           </a:p>
           <a:p>
             <a:pPr>
@@ -6526,11 +6434,7 @@
               </a:lnSpc>
             </a:pPr>
             <a:r>
-              <a:rPr lang="it-IT" dirty="0">
-                <a:solidFill>
-                  <a:srgbClr val="FFC000"/>
-                </a:solidFill>
-              </a:rPr>
+              <a:rPr lang="it-IT" dirty="0"/>
               <a:t>Aggiornare i dati di un mio progetto</a:t>
             </a:r>
           </a:p>
@@ -6541,11 +6445,7 @@
               </a:lnSpc>
             </a:pPr>
             <a:r>
-              <a:rPr lang="it-IT" dirty="0">
-                <a:solidFill>
-                  <a:srgbClr val="00B050"/>
-                </a:solidFill>
-              </a:rPr>
+              <a:rPr lang="it-IT" dirty="0"/>
               <a:t>Cancellare un mio progetto</a:t>
             </a:r>
           </a:p>
@@ -6556,11 +6456,7 @@
               </a:lnSpc>
             </a:pPr>
             <a:r>
-              <a:rPr lang="it-IT" dirty="0">
-                <a:solidFill>
-                  <a:srgbClr val="00B050"/>
-                </a:solidFill>
-              </a:rPr>
+              <a:rPr lang="it-IT" dirty="0"/>
               <a:t>Condividere un mio progetto con un altro utente</a:t>
             </a:r>
           </a:p>
@@ -6571,27 +6467,15 @@
               </a:lnSpc>
             </a:pPr>
             <a:r>
-              <a:rPr lang="it-IT" dirty="0">
-                <a:solidFill>
-                  <a:srgbClr val="00B050"/>
-                </a:solidFill>
-              </a:rPr>
+              <a:rPr lang="it-IT" dirty="0"/>
               <a:t>Aggiungere un </a:t>
             </a:r>
             <a:r>
-              <a:rPr lang="it-IT" dirty="0" err="1">
-                <a:solidFill>
-                  <a:srgbClr val="00B050"/>
-                </a:solidFill>
-              </a:rPr>
+              <a:rPr lang="it-IT" dirty="0" err="1"/>
               <a:t>tag</a:t>
             </a:r>
             <a:r>
-              <a:rPr lang="it-IT" dirty="0">
-                <a:solidFill>
-                  <a:srgbClr val="00B050"/>
-                </a:solidFill>
-              </a:rPr>
+              <a:rPr lang="it-IT" dirty="0"/>
               <a:t> ad un mio progetto (estensione)</a:t>
             </a:r>
           </a:p>
@@ -6601,11 +6485,7 @@
                 <a:spcPct val="150000"/>
               </a:lnSpc>
             </a:pPr>
-            <a:endParaRPr lang="it-IT" sz="1800" dirty="0">
-              <a:solidFill>
-                <a:srgbClr val="00B050"/>
-              </a:solidFill>
-            </a:endParaRPr>
+            <a:endParaRPr lang="it-IT" sz="1800" dirty="0"/>
           </a:p>
           <a:p>
             <a:pPr>
@@ -6721,11 +6601,7 @@
               </a:lnSpc>
             </a:pPr>
             <a:r>
-              <a:rPr lang="it-IT" dirty="0">
-                <a:solidFill>
-                  <a:srgbClr val="00B050"/>
-                </a:solidFill>
-              </a:rPr>
+              <a:rPr lang="it-IT" dirty="0"/>
               <a:t>Aggiungere un nuovo Task a un mio progetto</a:t>
             </a:r>
           </a:p>
@@ -6736,18 +6612,10 @@
               </a:lnSpc>
             </a:pPr>
             <a:r>
-              <a:rPr lang="it-IT" dirty="0">
-                <a:solidFill>
-                  <a:srgbClr val="FFC000"/>
-                </a:solidFill>
-              </a:rPr>
+              <a:rPr lang="it-IT" dirty="0"/>
               <a:t>Aggiornare un Task di un mio progetto</a:t>
             </a:r>
-            <a:endParaRPr lang="it-IT" sz="2100" dirty="0">
-              <a:solidFill>
-                <a:srgbClr val="FFC000"/>
-              </a:solidFill>
-            </a:endParaRPr>
+            <a:endParaRPr lang="it-IT" sz="2100" dirty="0"/>
           </a:p>
           <a:p>
             <a:pPr>
@@ -6756,11 +6624,7 @@
               </a:lnSpc>
             </a:pPr>
             <a:r>
-              <a:rPr lang="it-IT" dirty="0">
-                <a:solidFill>
-                  <a:srgbClr val="00B050"/>
-                </a:solidFill>
-              </a:rPr>
+              <a:rPr lang="it-IT" dirty="0"/>
               <a:t>Cancellare un Task da un mio progetto</a:t>
             </a:r>
           </a:p>
@@ -6771,11 +6635,7 @@
               </a:lnSpc>
             </a:pPr>
             <a:r>
-              <a:rPr lang="it-IT" dirty="0">
-                <a:solidFill>
-                  <a:srgbClr val="FFC000"/>
-                </a:solidFill>
-              </a:rPr>
+              <a:rPr lang="it-IT" dirty="0"/>
               <a:t>Assegnare un Task di un mio progetto ad un utente che ha visibilità sul mio progetto</a:t>
             </a:r>
           </a:p>
@@ -6786,28 +6646,8 @@
               </a:lnSpc>
             </a:pPr>
             <a:r>
-              <a:rPr lang="it-IT" dirty="0">
-                <a:solidFill>
-                  <a:srgbClr val="00B050"/>
-                </a:solidFill>
-              </a:rPr>
-              <a:t>Aggiungere un Tag ad un task </a:t>
-            </a:r>
-            <a:r>
-              <a:rPr lang="it-IT" dirty="0">
-                <a:solidFill>
-                  <a:srgbClr val="FFC000"/>
-                </a:solidFill>
-              </a:rPr>
-              <a:t>di un mio progetto </a:t>
-            </a:r>
-            <a:r>
-              <a:rPr lang="it-IT" dirty="0">
-                <a:solidFill>
-                  <a:srgbClr val="00B050"/>
-                </a:solidFill>
-              </a:rPr>
-              <a:t>(estensione)</a:t>
+              <a:rPr lang="it-IT" dirty="0"/>
+              <a:t>Aggiungere un Tag ad un task di un mio progetto (estensione)</a:t>
             </a:r>
           </a:p>
           <a:p>
@@ -6817,24 +6657,8 @@
               </a:lnSpc>
             </a:pPr>
             <a:r>
-              <a:rPr lang="it-IT" dirty="0">
-                <a:solidFill>
-                  <a:srgbClr val="00B050"/>
-                </a:solidFill>
-              </a:rPr>
-              <a:t>Aggiungere un Commento ad un Task di un progetto </a:t>
-            </a:r>
-            <a:r>
-              <a:rPr lang="it-IT" dirty="0">
-                <a:solidFill>
-                  <a:srgbClr val="FFC000"/>
-                </a:solidFill>
-              </a:rPr>
-              <a:t>su cui ho visibilità </a:t>
-            </a:r>
-            <a:r>
               <a:rPr lang="it-IT" dirty="0"/>
-              <a:t>(estensione)</a:t>
+              <a:t>Aggiungere un Commento ad un Task di un progetto su cui ho visibilità (estensione)</a:t>
             </a:r>
           </a:p>
         </p:txBody>

</xml_diff>

<commit_message>
Revert "Revert "modificati alcuni riferimenti delle request (resi coerenti con il relativo controller)""
This reverts commit 56f1f7f6171033977ad45a922d9f7f39c8255bcb.
</commit_message>
<xml_diff>
--- a/Direttive progetto e class diagram/siw-progetto-giugno-2020.pptx
+++ b/Direttive progetto e class diagram/siw-progetto-giugno-2020.pptx
@@ -218,7 +218,7 @@
           <a:p>
             <a:fld id="{6AF75452-8E9B-2A4A-993A-81C6082A6AE5}" type="datetimeFigureOut">
               <a:rPr lang="it-IT" smtClean="0"/>
-              <a:t>31/05/2020</a:t>
+              <a:t>16/06/2020</a:t>
             </a:fld>
             <a:endParaRPr lang="en-US"/>
           </a:p>
@@ -518,14 +518,14 @@
           <a:ln/>
           <a:extLst>
             <a:ext uri="{909E8E84-426E-40dd-AFC4-6F175D3DCCD1}">
-              <a14:hiddenFill xmlns:a14="http://schemas.microsoft.com/office/drawing/2010/main" xmlns="">
+              <a14:hiddenFill xmlns="" xmlns:a14="http://schemas.microsoft.com/office/drawing/2010/main">
                 <a:solidFill>
                   <a:srgbClr val="FFFFFF"/>
                 </a:solidFill>
               </a14:hiddenFill>
             </a:ext>
             <a:ext uri="{91240B29-F687-4f45-9708-019B960494DF}">
-              <a14:hiddenLine xmlns:a14="http://schemas.microsoft.com/office/drawing/2010/main" xmlns="" w="9525">
+              <a14:hiddenLine xmlns="" xmlns:a14="http://schemas.microsoft.com/office/drawing/2010/main" w="9525">
                 <a:solidFill>
                   <a:srgbClr val="000000"/>
                 </a:solidFill>
@@ -685,14 +685,14 @@
           <a:ln/>
           <a:extLst>
             <a:ext uri="{909E8E84-426E-40dd-AFC4-6F175D3DCCD1}">
-              <a14:hiddenFill xmlns:a14="http://schemas.microsoft.com/office/drawing/2010/main" xmlns="">
+              <a14:hiddenFill xmlns="" xmlns:a14="http://schemas.microsoft.com/office/drawing/2010/main">
                 <a:solidFill>
                   <a:srgbClr val="FFFFFF"/>
                 </a:solidFill>
               </a14:hiddenFill>
             </a:ext>
             <a:ext uri="{91240B29-F687-4f45-9708-019B960494DF}">
-              <a14:hiddenLine xmlns:a14="http://schemas.microsoft.com/office/drawing/2010/main" xmlns="" w="9525">
+              <a14:hiddenLine xmlns="" xmlns:a14="http://schemas.microsoft.com/office/drawing/2010/main" w="9525">
                 <a:solidFill>
                   <a:srgbClr val="000000"/>
                 </a:solidFill>
@@ -702,7 +702,7 @@
               </a14:hiddenLine>
             </a:ext>
             <a:ext uri="{FAA26D3D-D897-4be2-8F04-BA451C77F1D7}">
-              <ma14:placeholderFlag xmlns:ma14="http://schemas.microsoft.com/office/mac/drawingml/2011/main" xmlns="" val="1"/>
+              <ma14:placeholderFlag xmlns="" xmlns:ma14="http://schemas.microsoft.com/office/mac/drawingml/2011/main" val="1"/>
             </a:ext>
           </a:extLst>
         </p:spPr>
@@ -755,14 +755,14 @@
           <a:ln/>
           <a:extLst>
             <a:ext uri="{909E8E84-426E-40dd-AFC4-6F175D3DCCD1}">
-              <a14:hiddenFill xmlns:a14="http://schemas.microsoft.com/office/drawing/2010/main" xmlns="">
+              <a14:hiddenFill xmlns="" xmlns:a14="http://schemas.microsoft.com/office/drawing/2010/main">
                 <a:solidFill>
                   <a:srgbClr val="FFFFFF"/>
                 </a:solidFill>
               </a14:hiddenFill>
             </a:ext>
             <a:ext uri="{91240B29-F687-4f45-9708-019B960494DF}">
-              <a14:hiddenLine xmlns:a14="http://schemas.microsoft.com/office/drawing/2010/main" xmlns="" w="9525">
+              <a14:hiddenLine xmlns="" xmlns:a14="http://schemas.microsoft.com/office/drawing/2010/main" w="9525">
                 <a:solidFill>
                   <a:srgbClr val="000000"/>
                 </a:solidFill>
@@ -923,14 +923,14 @@
           <a:ln/>
           <a:extLst>
             <a:ext uri="{909E8E84-426E-40dd-AFC4-6F175D3DCCD1}">
-              <a14:hiddenFill xmlns:a14="http://schemas.microsoft.com/office/drawing/2010/main" xmlns="">
+              <a14:hiddenFill xmlns="" xmlns:a14="http://schemas.microsoft.com/office/drawing/2010/main">
                 <a:solidFill>
                   <a:srgbClr val="FFFFFF"/>
                 </a:solidFill>
               </a14:hiddenFill>
             </a:ext>
             <a:ext uri="{91240B29-F687-4f45-9708-019B960494DF}">
-              <a14:hiddenLine xmlns:a14="http://schemas.microsoft.com/office/drawing/2010/main" xmlns="" w="9525">
+              <a14:hiddenLine xmlns="" xmlns:a14="http://schemas.microsoft.com/office/drawing/2010/main" w="9525">
                 <a:solidFill>
                   <a:srgbClr val="000000"/>
                 </a:solidFill>
@@ -940,7 +940,7 @@
               </a14:hiddenLine>
             </a:ext>
             <a:ext uri="{FAA26D3D-D897-4be2-8F04-BA451C77F1D7}">
-              <ma14:placeholderFlag xmlns:ma14="http://schemas.microsoft.com/office/mac/drawingml/2011/main" xmlns="" val="1"/>
+              <ma14:placeholderFlag xmlns="" xmlns:ma14="http://schemas.microsoft.com/office/mac/drawingml/2011/main" val="1"/>
             </a:ext>
           </a:extLst>
         </p:spPr>
@@ -993,14 +993,14 @@
           <a:ln/>
           <a:extLst>
             <a:ext uri="{909E8E84-426E-40dd-AFC4-6F175D3DCCD1}">
-              <a14:hiddenFill xmlns:a14="http://schemas.microsoft.com/office/drawing/2010/main" xmlns="">
+              <a14:hiddenFill xmlns="" xmlns:a14="http://schemas.microsoft.com/office/drawing/2010/main">
                 <a:solidFill>
                   <a:srgbClr val="FFFFFF"/>
                 </a:solidFill>
               </a14:hiddenFill>
             </a:ext>
             <a:ext uri="{91240B29-F687-4f45-9708-019B960494DF}">
-              <a14:hiddenLine xmlns:a14="http://schemas.microsoft.com/office/drawing/2010/main" xmlns="" w="9525">
+              <a14:hiddenLine xmlns="" xmlns:a14="http://schemas.microsoft.com/office/drawing/2010/main" w="9525">
                 <a:solidFill>
                   <a:srgbClr val="000000"/>
                 </a:solidFill>
@@ -1161,14 +1161,14 @@
           <a:ln/>
           <a:extLst>
             <a:ext uri="{909E8E84-426E-40dd-AFC4-6F175D3DCCD1}">
-              <a14:hiddenFill xmlns:a14="http://schemas.microsoft.com/office/drawing/2010/main" xmlns="">
+              <a14:hiddenFill xmlns="" xmlns:a14="http://schemas.microsoft.com/office/drawing/2010/main">
                 <a:solidFill>
                   <a:srgbClr val="FFFFFF"/>
                 </a:solidFill>
               </a14:hiddenFill>
             </a:ext>
             <a:ext uri="{91240B29-F687-4f45-9708-019B960494DF}">
-              <a14:hiddenLine xmlns:a14="http://schemas.microsoft.com/office/drawing/2010/main" xmlns="" w="9525">
+              <a14:hiddenLine xmlns="" xmlns:a14="http://schemas.microsoft.com/office/drawing/2010/main" w="9525">
                 <a:solidFill>
                   <a:srgbClr val="000000"/>
                 </a:solidFill>
@@ -1178,7 +1178,7 @@
               </a14:hiddenLine>
             </a:ext>
             <a:ext uri="{FAA26D3D-D897-4be2-8F04-BA451C77F1D7}">
-              <ma14:placeholderFlag xmlns:ma14="http://schemas.microsoft.com/office/mac/drawingml/2011/main" xmlns="" val="1"/>
+              <ma14:placeholderFlag xmlns="" xmlns:ma14="http://schemas.microsoft.com/office/mac/drawingml/2011/main" val="1"/>
             </a:ext>
           </a:extLst>
         </p:spPr>
@@ -1774,7 +1774,7 @@
           <a:p>
             <a:fld id="{7A805A2E-4434-7E48-B506-6CB9726E48D0}" type="datetimeFigureOut">
               <a:rPr lang="it-IT" smtClean="0"/>
-              <a:t>31/05/2020</a:t>
+              <a:t>16/06/2020</a:t>
             </a:fld>
             <a:endParaRPr lang="en-US"/>
           </a:p>
@@ -1956,7 +1956,7 @@
           <a:p>
             <a:fld id="{7A805A2E-4434-7E48-B506-6CB9726E48D0}" type="datetimeFigureOut">
               <a:rPr lang="it-IT" smtClean="0"/>
-              <a:t>31/05/2020</a:t>
+              <a:t>16/06/2020</a:t>
             </a:fld>
             <a:endParaRPr lang="en-US"/>
           </a:p>
@@ -2148,7 +2148,7 @@
           <a:p>
             <a:fld id="{7A805A2E-4434-7E48-B506-6CB9726E48D0}" type="datetimeFigureOut">
               <a:rPr lang="it-IT" smtClean="0"/>
-              <a:t>31/05/2020</a:t>
+              <a:t>16/06/2020</a:t>
             </a:fld>
             <a:endParaRPr lang="en-US"/>
           </a:p>
@@ -2330,7 +2330,7 @@
           <a:p>
             <a:fld id="{7A805A2E-4434-7E48-B506-6CB9726E48D0}" type="datetimeFigureOut">
               <a:rPr lang="it-IT" smtClean="0"/>
-              <a:t>31/05/2020</a:t>
+              <a:t>16/06/2020</a:t>
             </a:fld>
             <a:endParaRPr lang="en-US"/>
           </a:p>
@@ -2588,7 +2588,7 @@
           <a:p>
             <a:fld id="{7A805A2E-4434-7E48-B506-6CB9726E48D0}" type="datetimeFigureOut">
               <a:rPr lang="it-IT" smtClean="0"/>
-              <a:t>31/05/2020</a:t>
+              <a:t>16/06/2020</a:t>
             </a:fld>
             <a:endParaRPr lang="en-US"/>
           </a:p>
@@ -2888,7 +2888,7 @@
           <a:p>
             <a:fld id="{7A805A2E-4434-7E48-B506-6CB9726E48D0}" type="datetimeFigureOut">
               <a:rPr lang="it-IT" smtClean="0"/>
-              <a:t>31/05/2020</a:t>
+              <a:t>16/06/2020</a:t>
             </a:fld>
             <a:endParaRPr lang="en-US"/>
           </a:p>
@@ -3322,7 +3322,7 @@
           <a:p>
             <a:fld id="{7A805A2E-4434-7E48-B506-6CB9726E48D0}" type="datetimeFigureOut">
               <a:rPr lang="it-IT" smtClean="0"/>
-              <a:t>31/05/2020</a:t>
+              <a:t>16/06/2020</a:t>
             </a:fld>
             <a:endParaRPr lang="en-US"/>
           </a:p>
@@ -3452,7 +3452,7 @@
           <a:p>
             <a:fld id="{7A805A2E-4434-7E48-B506-6CB9726E48D0}" type="datetimeFigureOut">
               <a:rPr lang="it-IT" smtClean="0"/>
-              <a:t>31/05/2020</a:t>
+              <a:t>16/06/2020</a:t>
             </a:fld>
             <a:endParaRPr lang="en-US"/>
           </a:p>
@@ -3559,7 +3559,7 @@
           <a:p>
             <a:fld id="{7A805A2E-4434-7E48-B506-6CB9726E48D0}" type="datetimeFigureOut">
               <a:rPr lang="it-IT" smtClean="0"/>
-              <a:t>31/05/2020</a:t>
+              <a:t>16/06/2020</a:t>
             </a:fld>
             <a:endParaRPr lang="en-US"/>
           </a:p>
@@ -3848,7 +3848,7 @@
           <a:p>
             <a:fld id="{7A805A2E-4434-7E48-B506-6CB9726E48D0}" type="datetimeFigureOut">
               <a:rPr lang="it-IT" smtClean="0"/>
-              <a:t>31/05/2020</a:t>
+              <a:t>16/06/2020</a:t>
             </a:fld>
             <a:endParaRPr lang="en-US"/>
           </a:p>
@@ -4113,7 +4113,7 @@
           <a:p>
             <a:fld id="{7A805A2E-4434-7E48-B506-6CB9726E48D0}" type="datetimeFigureOut">
               <a:rPr lang="it-IT" smtClean="0"/>
-              <a:t>31/05/2020</a:t>
+              <a:t>16/06/2020</a:t>
             </a:fld>
             <a:endParaRPr lang="en-US"/>
           </a:p>
@@ -4338,7 +4338,7 @@
           <a:p>
             <a:fld id="{7A805A2E-4434-7E48-B506-6CB9726E48D0}" type="datetimeFigureOut">
               <a:rPr lang="it-IT" smtClean="0"/>
-              <a:t>31/05/2020</a:t>
+              <a:t>16/06/2020</a:t>
             </a:fld>
             <a:endParaRPr lang="en-US"/>
           </a:p>
@@ -4742,7 +4742,7 @@
           </a:xfrm>
           <a:extLst>
             <a:ext uri="{91240B29-F687-4f45-9708-019B960494DF}">
-              <a14:hiddenLine xmlns:a14="http://schemas.microsoft.com/office/drawing/2010/main" xmlns="" w="9525">
+              <a14:hiddenLine xmlns="" xmlns:a14="http://schemas.microsoft.com/office/drawing/2010/main" w="9525">
                 <a:solidFill>
                   <a:schemeClr val="accent2"/>
                 </a:solidFill>
@@ -5576,7 +5576,7 @@
             <a:r>
               <a:rPr lang="it-IT" sz="2800" dirty="0">
                 <a:solidFill>
-                  <a:srgbClr val="FFC000"/>
+                  <a:srgbClr val="00B050"/>
                 </a:solidFill>
               </a:rPr>
               <a:t>Possono usare il sistema due tipologie di attori: gli utenti registrati e l'amministratore</a:t>
@@ -5591,14 +5591,14 @@
             <a:r>
               <a:rPr lang="it-IT" sz="2800" dirty="0">
                 <a:solidFill>
-                  <a:srgbClr val="FFC000"/>
+                  <a:srgbClr val="00B050"/>
                 </a:solidFill>
               </a:rPr>
               <a:t>Gli utenti possono creare e gestire Progetti</a:t>
             </a:r>
             <a:endParaRPr lang="it-IT" sz="2400" dirty="0">
               <a:solidFill>
-                <a:srgbClr val="FFC000"/>
+                <a:srgbClr val="00B050"/>
               </a:solidFill>
             </a:endParaRPr>
           </a:p>
@@ -5611,14 +5611,14 @@
             <a:r>
               <a:rPr lang="it-IT" sz="2800" dirty="0">
                 <a:solidFill>
-                  <a:srgbClr val="FFC000"/>
+                  <a:srgbClr val="00B050"/>
                 </a:solidFill>
               </a:rPr>
               <a:t>L'amministratore può cancellare gli utenti e i loro progetti</a:t>
             </a:r>
             <a:endParaRPr lang="it-IT" sz="2400" dirty="0">
               <a:solidFill>
-                <a:srgbClr val="FFC000"/>
+                <a:srgbClr val="00B050"/>
               </a:solidFill>
             </a:endParaRPr>
           </a:p>
@@ -5800,7 +5800,11 @@
               <a:defRPr/>
             </a:pPr>
             <a:r>
-              <a:rPr lang="it-IT" sz="2000" dirty="0"/>
+              <a:rPr lang="it-IT" sz="2000" dirty="0">
+                <a:solidFill>
+                  <a:srgbClr val="00B050"/>
+                </a:solidFill>
+              </a:rPr>
               <a:t>si autentica sul sistema con un username (univoco) e password</a:t>
             </a:r>
           </a:p>
@@ -5812,7 +5816,11 @@
               <a:defRPr/>
             </a:pPr>
             <a:r>
-              <a:rPr lang="it-IT" sz="2000" dirty="0"/>
+              <a:rPr lang="it-IT" sz="2000" dirty="0">
+                <a:solidFill>
+                  <a:srgbClr val="00B050"/>
+                </a:solidFill>
+              </a:rPr>
               <a:t>può creare progetti</a:t>
             </a:r>
           </a:p>
@@ -5824,8 +5832,20 @@
               <a:defRPr/>
             </a:pPr>
             <a:r>
-              <a:rPr lang="it-IT" sz="2000" dirty="0"/>
-              <a:t>può aggiungere task ai propri progetti</a:t>
+              <a:rPr lang="it-IT" sz="2000" dirty="0">
+                <a:solidFill>
+                  <a:srgbClr val="00B050"/>
+                </a:solidFill>
+              </a:rPr>
+              <a:t>può aggiungere task </a:t>
+            </a:r>
+            <a:r>
+              <a:rPr lang="it-IT" sz="2000" dirty="0">
+                <a:solidFill>
+                  <a:srgbClr val="FFC000"/>
+                </a:solidFill>
+              </a:rPr>
+              <a:t>ai propri progetti</a:t>
             </a:r>
           </a:p>
           <a:p>
@@ -5836,8 +5856,28 @@
               <a:defRPr/>
             </a:pPr>
             <a:r>
-              <a:rPr lang="it-IT" sz="2000" dirty="0"/>
-              <a:t>può concedere la visibilità dei propri progetti ad altri utenti</a:t>
+              <a:rPr lang="it-IT" sz="2000" dirty="0">
+                <a:solidFill>
+                  <a:srgbClr val="00B050"/>
+                </a:solidFill>
+              </a:rPr>
+              <a:t>può concedere la visibilità </a:t>
+            </a:r>
+            <a:r>
+              <a:rPr lang="it-IT" sz="2000" dirty="0">
+                <a:solidFill>
+                  <a:srgbClr val="FFC000"/>
+                </a:solidFill>
+              </a:rPr>
+              <a:t>dei propri progetti </a:t>
+            </a:r>
+            <a:r>
+              <a:rPr lang="it-IT" sz="2000" dirty="0">
+                <a:solidFill>
+                  <a:srgbClr val="00B050"/>
+                </a:solidFill>
+              </a:rPr>
+              <a:t>ad altri utenti</a:t>
             </a:r>
           </a:p>
           <a:p>
@@ -6032,7 +6072,11 @@
               <a:defRPr/>
             </a:pPr>
             <a:r>
-              <a:rPr lang="it-IT" sz="2000" dirty="0"/>
+              <a:rPr lang="it-IT" sz="2000" dirty="0">
+                <a:solidFill>
+                  <a:srgbClr val="FFC000"/>
+                </a:solidFill>
+              </a:rPr>
               <a:t>Solo l'utente proprietario del progetto può effettuare l'assegnazione dei Tag al Task</a:t>
             </a:r>
           </a:p>
@@ -6046,10 +6090,18 @@
             <a:r>
               <a:rPr lang="it-IT" sz="2400" dirty="0">
                 <a:solidFill>
+                  <a:srgbClr val="FFC000"/>
+                </a:solidFill>
+              </a:rPr>
+              <a:t>Ogni utente che abbia visibilità di un progetto </a:t>
+            </a:r>
+            <a:r>
+              <a:rPr lang="it-IT" sz="2400" dirty="0">
+                <a:solidFill>
                   <a:srgbClr val="00B050"/>
                 </a:solidFill>
               </a:rPr>
-              <a:t>Ogni utente che abbia visibilità di un progetto può scrivere uno o più Commenti sotto qualsiasi Task di quel progetto</a:t>
+              <a:t>può scrivere uno o più Commenti sotto qualsiasi Task di quel progetto</a:t>
             </a:r>
             <a:endParaRPr lang="en-US" sz="2400" dirty="0">
               <a:solidFill>
@@ -6255,10 +6307,18 @@
               </a:lnSpc>
             </a:pPr>
             <a:r>
-              <a:rPr lang="it-IT" dirty="0" err="1"/>
+              <a:rPr lang="it-IT" dirty="0" err="1">
+                <a:solidFill>
+                  <a:srgbClr val="00B050"/>
+                </a:solidFill>
+              </a:rPr>
               <a:t>Signup</a:t>
             </a:r>
-            <a:endParaRPr lang="it-IT" dirty="0"/>
+            <a:endParaRPr lang="it-IT" dirty="0">
+              <a:solidFill>
+                <a:srgbClr val="00B050"/>
+              </a:solidFill>
+            </a:endParaRPr>
           </a:p>
           <a:p>
             <a:pPr>
@@ -6267,7 +6327,11 @@
               </a:lnSpc>
             </a:pPr>
             <a:r>
-              <a:rPr lang="it-IT" dirty="0"/>
+              <a:rPr lang="it-IT" dirty="0">
+                <a:solidFill>
+                  <a:srgbClr val="00B050"/>
+                </a:solidFill>
+              </a:rPr>
               <a:t>Autenticazione</a:t>
             </a:r>
           </a:p>
@@ -6278,7 +6342,11 @@
               </a:lnSpc>
             </a:pPr>
             <a:r>
-              <a:rPr lang="it-IT" dirty="0"/>
+              <a:rPr lang="it-IT" dirty="0">
+                <a:solidFill>
+                  <a:srgbClr val="00B050"/>
+                </a:solidFill>
+              </a:rPr>
               <a:t>Visualizzare il mio profilo</a:t>
             </a:r>
           </a:p>
@@ -6289,7 +6357,11 @@
               </a:lnSpc>
             </a:pPr>
             <a:r>
-              <a:rPr lang="it-IT" dirty="0"/>
+              <a:rPr lang="it-IT" dirty="0">
+                <a:solidFill>
+                  <a:srgbClr val="FFC000"/>
+                </a:solidFill>
+              </a:rPr>
               <a:t>Aggiornare il mio profilo</a:t>
             </a:r>
           </a:p>
@@ -6399,7 +6471,11 @@
               </a:lnSpc>
             </a:pPr>
             <a:r>
-              <a:rPr lang="it-IT" dirty="0"/>
+              <a:rPr lang="it-IT" dirty="0">
+                <a:solidFill>
+                  <a:srgbClr val="00B050"/>
+                </a:solidFill>
+              </a:rPr>
               <a:t>Creare un nuovo progetto</a:t>
             </a:r>
           </a:p>
@@ -6410,10 +6486,18 @@
               </a:lnSpc>
             </a:pPr>
             <a:r>
-              <a:rPr lang="it-IT" dirty="0"/>
+              <a:rPr lang="it-IT" dirty="0">
+                <a:solidFill>
+                  <a:srgbClr val="00B050"/>
+                </a:solidFill>
+              </a:rPr>
               <a:t>Visualizzare i miei progetti</a:t>
             </a:r>
-            <a:endParaRPr lang="it-IT" b="1" dirty="0"/>
+            <a:endParaRPr lang="it-IT" b="1" dirty="0">
+              <a:solidFill>
+                <a:srgbClr val="00B050"/>
+              </a:solidFill>
+            </a:endParaRPr>
           </a:p>
           <a:p>
             <a:pPr>
@@ -6422,10 +6506,18 @@
               </a:lnSpc>
             </a:pPr>
             <a:r>
-              <a:rPr lang="it-IT" dirty="0"/>
+              <a:rPr lang="it-IT" dirty="0">
+                <a:solidFill>
+                  <a:srgbClr val="00B050"/>
+                </a:solidFill>
+              </a:rPr>
               <a:t>Visualizzare i progetti condivisi con me</a:t>
             </a:r>
-            <a:endParaRPr lang="it-IT" b="1" dirty="0"/>
+            <a:endParaRPr lang="it-IT" b="1" dirty="0">
+              <a:solidFill>
+                <a:srgbClr val="00B050"/>
+              </a:solidFill>
+            </a:endParaRPr>
           </a:p>
           <a:p>
             <a:pPr>
@@ -6434,7 +6526,11 @@
               </a:lnSpc>
             </a:pPr>
             <a:r>
-              <a:rPr lang="it-IT" dirty="0"/>
+              <a:rPr lang="it-IT" dirty="0">
+                <a:solidFill>
+                  <a:srgbClr val="FFC000"/>
+                </a:solidFill>
+              </a:rPr>
               <a:t>Aggiornare i dati di un mio progetto</a:t>
             </a:r>
           </a:p>
@@ -6445,7 +6541,11 @@
               </a:lnSpc>
             </a:pPr>
             <a:r>
-              <a:rPr lang="it-IT" dirty="0"/>
+              <a:rPr lang="it-IT" dirty="0">
+                <a:solidFill>
+                  <a:srgbClr val="00B050"/>
+                </a:solidFill>
+              </a:rPr>
               <a:t>Cancellare un mio progetto</a:t>
             </a:r>
           </a:p>
@@ -6456,7 +6556,11 @@
               </a:lnSpc>
             </a:pPr>
             <a:r>
-              <a:rPr lang="it-IT" dirty="0"/>
+              <a:rPr lang="it-IT" dirty="0">
+                <a:solidFill>
+                  <a:srgbClr val="00B050"/>
+                </a:solidFill>
+              </a:rPr>
               <a:t>Condividere un mio progetto con un altro utente</a:t>
             </a:r>
           </a:p>
@@ -6467,15 +6571,27 @@
               </a:lnSpc>
             </a:pPr>
             <a:r>
-              <a:rPr lang="it-IT" dirty="0"/>
+              <a:rPr lang="it-IT" dirty="0">
+                <a:solidFill>
+                  <a:srgbClr val="00B050"/>
+                </a:solidFill>
+              </a:rPr>
               <a:t>Aggiungere un </a:t>
             </a:r>
             <a:r>
-              <a:rPr lang="it-IT" dirty="0" err="1"/>
+              <a:rPr lang="it-IT" dirty="0" err="1">
+                <a:solidFill>
+                  <a:srgbClr val="00B050"/>
+                </a:solidFill>
+              </a:rPr>
               <a:t>tag</a:t>
             </a:r>
             <a:r>
-              <a:rPr lang="it-IT" dirty="0"/>
+              <a:rPr lang="it-IT" dirty="0">
+                <a:solidFill>
+                  <a:srgbClr val="00B050"/>
+                </a:solidFill>
+              </a:rPr>
               <a:t> ad un mio progetto (estensione)</a:t>
             </a:r>
           </a:p>
@@ -6485,7 +6601,11 @@
                 <a:spcPct val="150000"/>
               </a:lnSpc>
             </a:pPr>
-            <a:endParaRPr lang="it-IT" sz="1800" dirty="0"/>
+            <a:endParaRPr lang="it-IT" sz="1800" dirty="0">
+              <a:solidFill>
+                <a:srgbClr val="00B050"/>
+              </a:solidFill>
+            </a:endParaRPr>
           </a:p>
           <a:p>
             <a:pPr>
@@ -6601,7 +6721,11 @@
               </a:lnSpc>
             </a:pPr>
             <a:r>
-              <a:rPr lang="it-IT" dirty="0"/>
+              <a:rPr lang="it-IT" dirty="0">
+                <a:solidFill>
+                  <a:srgbClr val="00B050"/>
+                </a:solidFill>
+              </a:rPr>
               <a:t>Aggiungere un nuovo Task a un mio progetto</a:t>
             </a:r>
           </a:p>
@@ -6612,10 +6736,18 @@
               </a:lnSpc>
             </a:pPr>
             <a:r>
-              <a:rPr lang="it-IT" dirty="0"/>
+              <a:rPr lang="it-IT" dirty="0">
+                <a:solidFill>
+                  <a:srgbClr val="FFC000"/>
+                </a:solidFill>
+              </a:rPr>
               <a:t>Aggiornare un Task di un mio progetto</a:t>
             </a:r>
-            <a:endParaRPr lang="it-IT" sz="2100" dirty="0"/>
+            <a:endParaRPr lang="it-IT" sz="2100" dirty="0">
+              <a:solidFill>
+                <a:srgbClr val="FFC000"/>
+              </a:solidFill>
+            </a:endParaRPr>
           </a:p>
           <a:p>
             <a:pPr>
@@ -6624,7 +6756,11 @@
               </a:lnSpc>
             </a:pPr>
             <a:r>
-              <a:rPr lang="it-IT" dirty="0"/>
+              <a:rPr lang="it-IT" dirty="0">
+                <a:solidFill>
+                  <a:srgbClr val="00B050"/>
+                </a:solidFill>
+              </a:rPr>
               <a:t>Cancellare un Task da un mio progetto</a:t>
             </a:r>
           </a:p>
@@ -6635,7 +6771,11 @@
               </a:lnSpc>
             </a:pPr>
             <a:r>
-              <a:rPr lang="it-IT" dirty="0"/>
+              <a:rPr lang="it-IT" dirty="0">
+                <a:solidFill>
+                  <a:srgbClr val="FFC000"/>
+                </a:solidFill>
+              </a:rPr>
               <a:t>Assegnare un Task di un mio progetto ad un utente che ha visibilità sul mio progetto</a:t>
             </a:r>
           </a:p>
@@ -6646,8 +6786,28 @@
               </a:lnSpc>
             </a:pPr>
             <a:r>
-              <a:rPr lang="it-IT" dirty="0"/>
-              <a:t>Aggiungere un Tag ad un task di un mio progetto (estensione)</a:t>
+              <a:rPr lang="it-IT" dirty="0">
+                <a:solidFill>
+                  <a:srgbClr val="00B050"/>
+                </a:solidFill>
+              </a:rPr>
+              <a:t>Aggiungere un Tag ad un task </a:t>
+            </a:r>
+            <a:r>
+              <a:rPr lang="it-IT" dirty="0">
+                <a:solidFill>
+                  <a:srgbClr val="FFC000"/>
+                </a:solidFill>
+              </a:rPr>
+              <a:t>di un mio progetto </a:t>
+            </a:r>
+            <a:r>
+              <a:rPr lang="it-IT" dirty="0">
+                <a:solidFill>
+                  <a:srgbClr val="00B050"/>
+                </a:solidFill>
+              </a:rPr>
+              <a:t>(estensione)</a:t>
             </a:r>
           </a:p>
           <a:p>
@@ -6657,8 +6817,24 @@
               </a:lnSpc>
             </a:pPr>
             <a:r>
+              <a:rPr lang="it-IT" dirty="0">
+                <a:solidFill>
+                  <a:srgbClr val="00B050"/>
+                </a:solidFill>
+              </a:rPr>
+              <a:t>Aggiungere un Commento ad un Task di un progetto </a:t>
+            </a:r>
+            <a:r>
+              <a:rPr lang="it-IT" dirty="0">
+                <a:solidFill>
+                  <a:srgbClr val="FFC000"/>
+                </a:solidFill>
+              </a:rPr>
+              <a:t>su cui ho visibilità </a:t>
+            </a:r>
+            <a:r>
               <a:rPr lang="it-IT" dirty="0"/>
-              <a:t>Aggiungere un Commento ad un Task di un progetto su cui ho visibilità (estensione)</a:t>
+              <a:t>(estensione)</a:t>
             </a:r>
           </a:p>
         </p:txBody>

</xml_diff>